<commit_message>
updated documentation and slide presentation;
</commit_message>
<xml_diff>
--- a/presentation/custom-angular-modules.pptx
+++ b/presentation/custom-angular-modules.pptx
@@ -7974,9 +7974,10 @@
           <a:lstStyle/>
           <a:p>
             <a:r>
-              <a:rPr lang="en-US" dirty="0"/>
-              <a:t>Reference via NPM</a:t>
-            </a:r>
+              <a:rPr lang="en-US" dirty="0" smtClean="0"/>
+              <a:t>See the Code</a:t>
+            </a:r>
+            <a:endParaRPr lang="en-US" dirty="0"/>
           </a:p>
         </p:txBody>
       </p:sp>
@@ -8001,6 +8002,26 @@
           <a:bodyPr/>
           <a:lstStyle/>
           <a:p>
+            <a:r>
+              <a:rPr lang="en-US" dirty="0" smtClean="0"/>
+              <a:t>Install the module</a:t>
+            </a:r>
+          </a:p>
+          <a:p>
+            <a:r>
+              <a:rPr lang="en-US" dirty="0" smtClean="0"/>
+              <a:t>Import the module/service</a:t>
+            </a:r>
+          </a:p>
+          <a:p>
+            <a:r>
+              <a:rPr lang="en-US" dirty="0" smtClean="0"/>
+              <a:t>Provide </a:t>
+            </a:r>
+            <a:r>
+              <a:rPr lang="en-US" smtClean="0"/>
+              <a:t>the service</a:t>
+            </a:r>
             <a:endParaRPr lang="en-US" dirty="0"/>
           </a:p>
         </p:txBody>

</xml_diff>

<commit_message>
updated presentation; documentation guide;
</commit_message>
<xml_diff>
--- a/presentation/custom-angular-modules.pptx
+++ b/presentation/custom-angular-modules.pptx
@@ -6580,9 +6580,17 @@
               <a:rPr lang="en-US" dirty="0" smtClean="0"/>
               <a:t> Presentation</a:t>
             </a:r>
-            <a:r>
-              <a:rPr lang="en-US" dirty="0" smtClean="0"/>
-              <a:t> </a:t>
+            <a:endParaRPr lang="en-US" dirty="0"/>
+          </a:p>
+          <a:p>
+            <a:pPr lvl="1"/>
+            <a:r>
+              <a:rPr lang="en-US" dirty="0" smtClean="0"/>
+              <a:t>Guide </a:t>
+            </a:r>
+            <a:r>
+              <a:rPr lang="en-US" smtClean="0"/>
+              <a:t>(markdown/PDF)</a:t>
             </a:r>
             <a:endParaRPr lang="en-US" dirty="0"/>
           </a:p>

</xml_diff>

<commit_message>
slide-deck presentation updates to resources;
</commit_message>
<xml_diff>
--- a/presentation/custom-angular-modules.pptx
+++ b/presentation/custom-angular-modules.pptx
@@ -4381,8 +4381,12 @@
           <a:lstStyle/>
           <a:p>
             <a:r>
-              <a:rPr lang="en-US" dirty="0" smtClean="0"/>
-              <a:t>Root </a:t>
+              <a:rPr lang="en-US" b="1" dirty="0" smtClean="0"/>
+              <a:t>Root</a:t>
+            </a:r>
+            <a:r>
+              <a:rPr lang="en-US" dirty="0" smtClean="0"/>
+              <a:t> </a:t>
             </a:r>
             <a:r>
               <a:rPr lang="en-US" dirty="0"/>
@@ -4395,27 +4399,43 @@
           </a:p>
           <a:p>
             <a:r>
-              <a:rPr lang="en-US" dirty="0" smtClean="0"/>
-              <a:t>Route Module: manage application routes</a:t>
+              <a:rPr lang="en-US" b="1" dirty="0" smtClean="0"/>
+              <a:t>Route</a:t>
+            </a:r>
+            <a:r>
+              <a:rPr lang="en-US" dirty="0" smtClean="0"/>
+              <a:t> Module: manage application routes</a:t>
             </a:r>
             <a:endParaRPr lang="en-US" dirty="0"/>
           </a:p>
           <a:p>
             <a:r>
-              <a:rPr lang="en-US" dirty="0"/>
-              <a:t>Shared Module: shared.module.ts</a:t>
-            </a:r>
-          </a:p>
-          <a:p>
-            <a:r>
-              <a:rPr lang="en-US" dirty="0"/>
-              <a:t>Core Module: core.module.ts</a:t>
-            </a:r>
-          </a:p>
-          <a:p>
-            <a:r>
-              <a:rPr lang="en-US" dirty="0"/>
-              <a:t>Feature Modules</a:t>
+              <a:rPr lang="en-US" b="1" dirty="0"/>
+              <a:t>Shared</a:t>
+            </a:r>
+            <a:r>
+              <a:rPr lang="en-US" dirty="0"/>
+              <a:t> Module: shared.module.ts</a:t>
+            </a:r>
+          </a:p>
+          <a:p>
+            <a:r>
+              <a:rPr lang="en-US" b="1" dirty="0"/>
+              <a:t>Core</a:t>
+            </a:r>
+            <a:r>
+              <a:rPr lang="en-US" dirty="0"/>
+              <a:t> Module: core.module.ts</a:t>
+            </a:r>
+          </a:p>
+          <a:p>
+            <a:r>
+              <a:rPr lang="en-US" b="1" dirty="0"/>
+              <a:t>Feature</a:t>
+            </a:r>
+            <a:r>
+              <a:rPr lang="en-US" dirty="0"/>
+              <a:t> Modules</a:t>
             </a:r>
           </a:p>
           <a:p>
@@ -5425,8 +5445,13 @@
             </a:r>
             <a:r>
               <a:rPr lang="en-US" dirty="0" smtClean="0"/>
-              <a:t>– base classes for components, services, business actions, and HTTP services.</a:t>
-            </a:r>
+              <a:t>– base classes for components, services, business actions, and HTTP </a:t>
+            </a:r>
+            <a:r>
+              <a:rPr lang="en-US" dirty="0" smtClean="0"/>
+              <a:t>services, etc.</a:t>
+            </a:r>
+            <a:endParaRPr lang="en-US" dirty="0" smtClean="0"/>
           </a:p>
           <a:p>
             <a:endParaRPr lang="en-US" dirty="0" smtClean="0"/>
@@ -5544,8 +5569,33 @@
           <a:p>
             <a:r>
               <a:rPr lang="en-US" dirty="0" smtClean="0"/>
-              <a:t>Helps determine the contents of the module.</a:t>
-            </a:r>
+              <a:t>Helps determine the contents of the module</a:t>
+            </a:r>
+            <a:r>
+              <a:rPr lang="en-US" dirty="0" smtClean="0"/>
+              <a:t>.</a:t>
+            </a:r>
+          </a:p>
+          <a:p>
+            <a:r>
+              <a:rPr lang="en-US" dirty="0" smtClean="0"/>
+              <a:t>Emerging Modules</a:t>
+            </a:r>
+          </a:p>
+          <a:p>
+            <a:pPr lvl="1"/>
+            <a:r>
+              <a:rPr lang="en-US" dirty="0" smtClean="0"/>
+              <a:t>Application features, components, services, infrastructure, frameworks change over time.</a:t>
+            </a:r>
+          </a:p>
+          <a:p>
+            <a:pPr lvl="1"/>
+            <a:r>
+              <a:rPr lang="en-US" dirty="0" smtClean="0"/>
+              <a:t>Evaluate what things need to be re-organized or refactored to a module.</a:t>
+            </a:r>
+            <a:endParaRPr lang="en-US" dirty="0" smtClean="0"/>
           </a:p>
           <a:p>
             <a:endParaRPr lang="en-US" dirty="0" smtClean="0"/>
@@ -6589,13 +6639,8 @@
             <a:pPr lvl="2"/>
             <a:r>
               <a:rPr lang="en-US" dirty="0" smtClean="0"/>
-              <a:t>Logging </a:t>
-            </a:r>
-            <a:r>
-              <a:rPr lang="en-US" smtClean="0"/>
-              <a:t>with configuration</a:t>
-            </a:r>
-            <a:endParaRPr lang="en-US" dirty="0" smtClean="0"/>
+              <a:t>Logging with configuration</a:t>
+            </a:r>
           </a:p>
           <a:p>
             <a:pPr lvl="1"/>
@@ -8036,9 +8081,24 @@
             </a:r>
           </a:p>
           <a:p>
+            <a:pPr lvl="1"/>
+            <a:r>
+              <a:rPr lang="en-US" dirty="0" err="1" smtClean="0"/>
+              <a:t>ngAppOne</a:t>
+            </a:r>
+            <a:endParaRPr lang="en-US" dirty="0" smtClean="0"/>
+          </a:p>
+          <a:p>
             <a:r>
               <a:rPr lang="en-US" dirty="0" smtClean="0"/>
               <a:t>Configuration for Modules/Services</a:t>
+            </a:r>
+          </a:p>
+          <a:p>
+            <a:pPr lvl="1"/>
+            <a:r>
+              <a:rPr lang="en-US" dirty="0" err="1" smtClean="0"/>
+              <a:t>ngAppDos</a:t>
             </a:r>
             <a:endParaRPr lang="en-US" dirty="0"/>
           </a:p>
@@ -8631,71 +8691,105 @@
               <a:rPr lang="en-US" dirty="0">
                 <a:hlinkClick r:id="rId2"/>
               </a:rPr>
-              <a:t>Brief history of JavaScript Modules</a:t>
-            </a:r>
-            <a:endParaRPr lang="en-US" dirty="0"/>
+              <a:t>Brief history of JavaScript </a:t>
+            </a:r>
+            <a:r>
+              <a:rPr lang="en-US" dirty="0" smtClean="0">
+                <a:hlinkClick r:id="rId2"/>
+              </a:rPr>
+              <a:t>Modules</a:t>
+            </a:r>
+            <a:endParaRPr lang="en-US" dirty="0" smtClean="0"/>
           </a:p>
           <a:p>
             <a:r>
               <a:rPr lang="en-US" dirty="0" smtClean="0">
                 <a:hlinkClick r:id="rId3"/>
               </a:rPr>
-              <a:t>https</a:t>
-            </a:r>
-            <a:r>
-              <a:rPr lang="en-US" dirty="0">
-                <a:hlinkClick r:id="rId3"/>
-              </a:rPr>
-              <a:t>://eloquentjavascript.net/10_modules.html</a:t>
-            </a:r>
-          </a:p>
-          <a:p>
-            <a:r>
-              <a:rPr lang="en-US" dirty="0" smtClean="0">
-                <a:hlinkClick r:id="rId3"/>
-              </a:rPr>
-              <a:t>What are </a:t>
-            </a:r>
-            <a:r>
-              <a:rPr lang="en-US" dirty="0" err="1" smtClean="0">
-                <a:hlinkClick r:id="rId3"/>
-              </a:rPr>
-              <a:t>Javascript</a:t>
-            </a:r>
-            <a:r>
-              <a:rPr lang="en-US" dirty="0" smtClean="0">
-                <a:hlinkClick r:id="rId3"/>
-              </a:rPr>
-              <a:t> modules?</a:t>
-            </a:r>
-            <a:endParaRPr lang="en-US" dirty="0" smtClean="0">
-              <a:hlinkClick r:id="rId4"/>
-            </a:endParaRPr>
+              <a:t>10-Minute Module Primer</a:t>
+            </a:r>
+            <a:endParaRPr lang="en-US" dirty="0"/>
           </a:p>
           <a:p>
             <a:r>
               <a:rPr lang="en-US" dirty="0" smtClean="0">
                 <a:hlinkClick r:id="rId4"/>
               </a:rPr>
-              <a:t>Core </a:t>
-            </a:r>
+              <a:t>https</a:t>
+            </a:r>
+            <a:r>
+              <a:rPr lang="en-US" dirty="0">
+                <a:hlinkClick r:id="rId4"/>
+              </a:rPr>
+              <a:t>://eloquentjavascript.net/10_modules.html</a:t>
+            </a:r>
+          </a:p>
+          <a:p>
             <a:r>
               <a:rPr lang="en-US" dirty="0" smtClean="0">
                 <a:hlinkClick r:id="rId4"/>
               </a:rPr>
-              <a:t>and Shared modules</a:t>
-            </a:r>
-            <a:r>
-              <a:rPr lang="en-US" dirty="0" smtClean="0"/>
-              <a:t>.</a:t>
-            </a:r>
-          </a:p>
-          <a:p>
-            <a:r>
-              <a:rPr lang="en-US" dirty="0">
+              <a:t>What are </a:t>
+            </a:r>
+            <a:r>
+              <a:rPr lang="en-US" dirty="0" err="1" smtClean="0">
+                <a:hlinkClick r:id="rId4"/>
+              </a:rPr>
+              <a:t>Javascript</a:t>
+            </a:r>
+            <a:r>
+              <a:rPr lang="en-US" dirty="0" smtClean="0">
+                <a:hlinkClick r:id="rId4"/>
+              </a:rPr>
+              <a:t> modules?</a:t>
+            </a:r>
+            <a:endParaRPr lang="en-US" dirty="0" smtClean="0">
+              <a:hlinkClick r:id="rId5"/>
+            </a:endParaRPr>
+          </a:p>
+          <a:p>
+            <a:r>
+              <a:rPr lang="en-US" dirty="0" smtClean="0">
                 <a:hlinkClick r:id="rId5"/>
               </a:rPr>
-              <a:t>What kinds of modules should I have and how should I use them?</a:t>
+              <a:t>Core </a:t>
+            </a:r>
+            <a:r>
+              <a:rPr lang="en-US" dirty="0" smtClean="0">
+                <a:hlinkClick r:id="rId5"/>
+              </a:rPr>
+              <a:t>and Shared modules</a:t>
+            </a:r>
+            <a:r>
+              <a:rPr lang="en-US" dirty="0" smtClean="0"/>
+              <a:t>.</a:t>
+            </a:r>
+          </a:p>
+          <a:p>
+            <a:r>
+              <a:rPr lang="en-US" dirty="0">
+                <a:hlinkClick r:id="rId6"/>
+              </a:rPr>
+              <a:t>What kinds of modules should I have and how should I use them</a:t>
+            </a:r>
+            <a:r>
+              <a:rPr lang="en-US" dirty="0" smtClean="0">
+                <a:hlinkClick r:id="rId6"/>
+              </a:rPr>
+              <a:t>?</a:t>
+            </a:r>
+            <a:endParaRPr lang="en-US" dirty="0" smtClean="0"/>
+          </a:p>
+          <a:p>
+            <a:r>
+              <a:rPr lang="en-US" dirty="0" smtClean="0"/>
+              <a:t>NEW!!: </a:t>
+            </a:r>
+            <a:r>
+              <a:rPr lang="en-US" dirty="0" smtClean="0">
+                <a:hlinkClick r:id="rId7"/>
+              </a:rPr>
+              <a:t>Angular Universal</a:t>
             </a:r>
             <a:endParaRPr lang="en-US" dirty="0"/>
           </a:p>

</xml_diff>

<commit_message>
refactor to remove component.base;
</commit_message>
<xml_diff>
--- a/presentation/custom-angular-modules.pptx
+++ b/presentation/custom-angular-modules.pptx
@@ -8594,7 +8594,55 @@
               <a:rPr lang="en-US" dirty="0">
                 <a:hlinkClick r:id="rId3"/>
               </a:rPr>
-              <a:t>SOLID Principles</a:t>
+              <a:t>SOLID </a:t>
+            </a:r>
+            <a:r>
+              <a:rPr lang="en-US" dirty="0" smtClean="0">
+                <a:hlinkClick r:id="rId3"/>
+              </a:rPr>
+              <a:t>Principles</a:t>
+            </a:r>
+            <a:endParaRPr lang="en-US" dirty="0" smtClean="0"/>
+          </a:p>
+          <a:p>
+            <a:r>
+              <a:rPr lang="en-US" dirty="0" smtClean="0"/>
+              <a:t>Object-Oriented Principles</a:t>
+            </a:r>
+          </a:p>
+          <a:p>
+            <a:pPr lvl="1"/>
+            <a:r>
+              <a:rPr lang="en-US" dirty="0" smtClean="0"/>
+              <a:t>Objects, classes</a:t>
+            </a:r>
+          </a:p>
+          <a:p>
+            <a:pPr lvl="1"/>
+            <a:r>
+              <a:rPr lang="en-US" dirty="0" smtClean="0"/>
+              <a:t>Encapsulation</a:t>
+            </a:r>
+          </a:p>
+          <a:p>
+            <a:pPr lvl="1"/>
+            <a:r>
+              <a:rPr lang="en-US" dirty="0" smtClean="0"/>
+              <a:t>Inheritance</a:t>
+            </a:r>
+          </a:p>
+          <a:p>
+            <a:pPr lvl="1"/>
+            <a:r>
+              <a:rPr lang="en-US" dirty="0" smtClean="0"/>
+              <a:t>Polymorphism</a:t>
+            </a:r>
+          </a:p>
+          <a:p>
+            <a:pPr lvl="1"/>
+            <a:r>
+              <a:rPr lang="en-US" dirty="0" smtClean="0"/>
+              <a:t>Design Patterns</a:t>
             </a:r>
             <a:endParaRPr lang="en-US" dirty="0"/>
           </a:p>

</xml_diff>